<commit_message>
Add slide of Aurélien
</commit_message>
<xml_diff>
--- a/Rapport/Diapo_ihm_pepper.pptx
+++ b/Rapport/Diapo_ihm_pepper.pptx
@@ -5,10 +5,10 @@
     <p:sldMasterId id="2147483648" r:id="rId1"/>
   </p:sldMasterIdLst>
   <p:notesMasterIdLst>
-    <p:notesMasterId r:id="rId24"/>
+    <p:notesMasterId r:id="rId25"/>
   </p:notesMasterIdLst>
   <p:handoutMasterIdLst>
-    <p:handoutMasterId r:id="rId25"/>
+    <p:handoutMasterId r:id="rId26"/>
   </p:handoutMasterIdLst>
   <p:sldIdLst>
     <p:sldId id="256" r:id="rId2"/>
@@ -23,16 +23,17 @@
     <p:sldId id="268" r:id="rId11"/>
     <p:sldId id="269" r:id="rId12"/>
     <p:sldId id="270" r:id="rId13"/>
-    <p:sldId id="271" r:id="rId14"/>
-    <p:sldId id="275" r:id="rId15"/>
-    <p:sldId id="276" r:id="rId16"/>
-    <p:sldId id="277" r:id="rId17"/>
-    <p:sldId id="278" r:id="rId18"/>
-    <p:sldId id="279" r:id="rId19"/>
-    <p:sldId id="280" r:id="rId20"/>
-    <p:sldId id="272" r:id="rId21"/>
-    <p:sldId id="274" r:id="rId22"/>
-    <p:sldId id="273" r:id="rId23"/>
+    <p:sldId id="281" r:id="rId14"/>
+    <p:sldId id="271" r:id="rId15"/>
+    <p:sldId id="275" r:id="rId16"/>
+    <p:sldId id="276" r:id="rId17"/>
+    <p:sldId id="277" r:id="rId18"/>
+    <p:sldId id="278" r:id="rId19"/>
+    <p:sldId id="279" r:id="rId20"/>
+    <p:sldId id="280" r:id="rId21"/>
+    <p:sldId id="272" r:id="rId22"/>
+    <p:sldId id="274" r:id="rId23"/>
+    <p:sldId id="273" r:id="rId24"/>
   </p:sldIdLst>
   <p:sldSz cx="12192000" cy="6858000"/>
   <p:notesSz cx="6858000" cy="9144000"/>
@@ -137,10 +138,6 @@
     </p:ext>
   </p:extLst>
 </p:presentation>
-</file>
-
-<file path=ppt/revisionInfo.xml><?xml version="1.0" encoding="utf-8"?>
-<p1510:revInfo xmlns:a="http://schemas.openxmlformats.org/drawingml/2006/main" xmlns:r="http://schemas.openxmlformats.org/officeDocument/2006/relationships" xmlns:p1510="http://schemas.microsoft.com/office/powerpoint/2015/10/main"/>
 </file>
 
 <file path=ppt/charts/chart1.xml><?xml version="1.0" encoding="utf-8"?>
@@ -220,6 +217,11 @@
               </a:ln>
               <a:effectLst/>
             </c:spPr>
+            <c:extLst>
+              <c:ext xmlns:c16="http://schemas.microsoft.com/office/drawing/2014/chart" uri="{C3380CC4-5D6E-409C-BE32-E72D297353CC}">
+                <c16:uniqueId val="{00000001-18E0-4A73-A3E1-0E2B33876AB2}"/>
+              </c:ext>
+            </c:extLst>
           </c:dPt>
           <c:dPt>
             <c:idx val="1"/>
@@ -235,6 +237,11 @@
               </a:ln>
               <a:effectLst/>
             </c:spPr>
+            <c:extLst>
+              <c:ext xmlns:c16="http://schemas.microsoft.com/office/drawing/2014/chart" uri="{C3380CC4-5D6E-409C-BE32-E72D297353CC}">
+                <c16:uniqueId val="{00000003-18E0-4A73-A3E1-0E2B33876AB2}"/>
+              </c:ext>
+            </c:extLst>
           </c:dPt>
           <c:dPt>
             <c:idx val="2"/>
@@ -250,6 +257,11 @@
               </a:ln>
               <a:effectLst/>
             </c:spPr>
+            <c:extLst>
+              <c:ext xmlns:c16="http://schemas.microsoft.com/office/drawing/2014/chart" uri="{C3380CC4-5D6E-409C-BE32-E72D297353CC}">
+                <c16:uniqueId val="{00000005-18E0-4A73-A3E1-0E2B33876AB2}"/>
+              </c:ext>
+            </c:extLst>
           </c:dPt>
           <c:dPt>
             <c:idx val="3"/>
@@ -480,6 +492,11 @@
               </a:ln>
               <a:effectLst/>
             </c:spPr>
+            <c:extLst>
+              <c:ext xmlns:c16="http://schemas.microsoft.com/office/drawing/2014/chart" uri="{C3380CC4-5D6E-409C-BE32-E72D297353CC}">
+                <c16:uniqueId val="{00000001-0511-4154-8769-F8F348D8A77C}"/>
+              </c:ext>
+            </c:extLst>
           </c:dPt>
           <c:dPt>
             <c:idx val="1"/>
@@ -495,6 +512,11 @@
               </a:ln>
               <a:effectLst/>
             </c:spPr>
+            <c:extLst>
+              <c:ext xmlns:c16="http://schemas.microsoft.com/office/drawing/2014/chart" uri="{C3380CC4-5D6E-409C-BE32-E72D297353CC}">
+                <c16:uniqueId val="{00000003-0511-4154-8769-F8F348D8A77C}"/>
+              </c:ext>
+            </c:extLst>
           </c:dPt>
           <c:dPt>
             <c:idx val="2"/>
@@ -510,6 +532,11 @@
               </a:ln>
               <a:effectLst/>
             </c:spPr>
+            <c:extLst>
+              <c:ext xmlns:c16="http://schemas.microsoft.com/office/drawing/2014/chart" uri="{C3380CC4-5D6E-409C-BE32-E72D297353CC}">
+                <c16:uniqueId val="{00000005-0511-4154-8769-F8F348D8A77C}"/>
+              </c:ext>
+            </c:extLst>
           </c:dPt>
           <c:dPt>
             <c:idx val="3"/>
@@ -740,6 +767,11 @@
               </a:ln>
               <a:effectLst/>
             </c:spPr>
+            <c:extLst>
+              <c:ext xmlns:c16="http://schemas.microsoft.com/office/drawing/2014/chart" uri="{C3380CC4-5D6E-409C-BE32-E72D297353CC}">
+                <c16:uniqueId val="{00000001-37FE-4FB7-BFCC-4B2ED4D701B5}"/>
+              </c:ext>
+            </c:extLst>
           </c:dPt>
           <c:dPt>
             <c:idx val="1"/>
@@ -755,6 +787,11 @@
               </a:ln>
               <a:effectLst/>
             </c:spPr>
+            <c:extLst>
+              <c:ext xmlns:c16="http://schemas.microsoft.com/office/drawing/2014/chart" uri="{C3380CC4-5D6E-409C-BE32-E72D297353CC}">
+                <c16:uniqueId val="{00000003-37FE-4FB7-BFCC-4B2ED4D701B5}"/>
+              </c:ext>
+            </c:extLst>
           </c:dPt>
           <c:dPt>
             <c:idx val="2"/>
@@ -770,6 +807,11 @@
               </a:ln>
               <a:effectLst/>
             </c:spPr>
+            <c:extLst>
+              <c:ext xmlns:c16="http://schemas.microsoft.com/office/drawing/2014/chart" uri="{C3380CC4-5D6E-409C-BE32-E72D297353CC}">
+                <c16:uniqueId val="{00000005-37FE-4FB7-BFCC-4B2ED4D701B5}"/>
+              </c:ext>
+            </c:extLst>
           </c:dPt>
           <c:dPt>
             <c:idx val="3"/>
@@ -1000,6 +1042,11 @@
               </a:ln>
               <a:effectLst/>
             </c:spPr>
+            <c:extLst>
+              <c:ext xmlns:c16="http://schemas.microsoft.com/office/drawing/2014/chart" uri="{C3380CC4-5D6E-409C-BE32-E72D297353CC}">
+                <c16:uniqueId val="{00000001-B132-40A4-9C9E-0BECD53C83BF}"/>
+              </c:ext>
+            </c:extLst>
           </c:dPt>
           <c:dPt>
             <c:idx val="1"/>
@@ -1015,6 +1062,11 @@
               </a:ln>
               <a:effectLst/>
             </c:spPr>
+            <c:extLst>
+              <c:ext xmlns:c16="http://schemas.microsoft.com/office/drawing/2014/chart" uri="{C3380CC4-5D6E-409C-BE32-E72D297353CC}">
+                <c16:uniqueId val="{00000003-B132-40A4-9C9E-0BECD53C83BF}"/>
+              </c:ext>
+            </c:extLst>
           </c:dPt>
           <c:dPt>
             <c:idx val="2"/>
@@ -1030,6 +1082,11 @@
               </a:ln>
               <a:effectLst/>
             </c:spPr>
+            <c:extLst>
+              <c:ext xmlns:c16="http://schemas.microsoft.com/office/drawing/2014/chart" uri="{C3380CC4-5D6E-409C-BE32-E72D297353CC}">
+                <c16:uniqueId val="{00000005-B132-40A4-9C9E-0BECD53C83BF}"/>
+              </c:ext>
+            </c:extLst>
           </c:dPt>
           <c:dPt>
             <c:idx val="3"/>
@@ -1260,6 +1317,11 @@
               </a:ln>
               <a:effectLst/>
             </c:spPr>
+            <c:extLst>
+              <c:ext xmlns:c16="http://schemas.microsoft.com/office/drawing/2014/chart" uri="{C3380CC4-5D6E-409C-BE32-E72D297353CC}">
+                <c16:uniqueId val="{00000001-1B0D-4F69-ACA9-E564DB3137AC}"/>
+              </c:ext>
+            </c:extLst>
           </c:dPt>
           <c:dPt>
             <c:idx val="1"/>
@@ -1275,6 +1337,11 @@
               </a:ln>
               <a:effectLst/>
             </c:spPr>
+            <c:extLst>
+              <c:ext xmlns:c16="http://schemas.microsoft.com/office/drawing/2014/chart" uri="{C3380CC4-5D6E-409C-BE32-E72D297353CC}">
+                <c16:uniqueId val="{00000003-1B0D-4F69-ACA9-E564DB3137AC}"/>
+              </c:ext>
+            </c:extLst>
           </c:dPt>
           <c:dPt>
             <c:idx val="2"/>
@@ -1290,6 +1357,11 @@
               </a:ln>
               <a:effectLst/>
             </c:spPr>
+            <c:extLst>
+              <c:ext xmlns:c16="http://schemas.microsoft.com/office/drawing/2014/chart" uri="{C3380CC4-5D6E-409C-BE32-E72D297353CC}">
+                <c16:uniqueId val="{00000005-1B0D-4F69-ACA9-E564DB3137AC}"/>
+              </c:ext>
+            </c:extLst>
           </c:dPt>
           <c:dPt>
             <c:idx val="3"/>
@@ -1500,6 +1572,11 @@
               </a:ln>
               <a:effectLst/>
             </c:spPr>
+            <c:extLst>
+              <c:ext xmlns:c16="http://schemas.microsoft.com/office/drawing/2014/chart" uri="{C3380CC4-5D6E-409C-BE32-E72D297353CC}">
+                <c16:uniqueId val="{00000001-1F24-4F4A-A905-6804C1C12B60}"/>
+              </c:ext>
+            </c:extLst>
           </c:dPt>
           <c:dPt>
             <c:idx val="1"/>
@@ -1515,6 +1592,11 @@
               </a:ln>
               <a:effectLst/>
             </c:spPr>
+            <c:extLst>
+              <c:ext xmlns:c16="http://schemas.microsoft.com/office/drawing/2014/chart" uri="{C3380CC4-5D6E-409C-BE32-E72D297353CC}">
+                <c16:uniqueId val="{00000003-1F24-4F4A-A905-6804C1C12B60}"/>
+              </c:ext>
+            </c:extLst>
           </c:dPt>
           <c:dPt>
             <c:idx val="2"/>
@@ -1530,6 +1612,11 @@
               </a:ln>
               <a:effectLst/>
             </c:spPr>
+            <c:extLst>
+              <c:ext xmlns:c16="http://schemas.microsoft.com/office/drawing/2014/chart" uri="{C3380CC4-5D6E-409C-BE32-E72D297353CC}">
+                <c16:uniqueId val="{00000005-1F24-4F4A-A905-6804C1C12B60}"/>
+              </c:ext>
+            </c:extLst>
           </c:dPt>
           <c:dPt>
             <c:idx val="3"/>
@@ -1545,6 +1632,11 @@
               </a:ln>
               <a:effectLst/>
             </c:spPr>
+            <c:extLst>
+              <c:ext xmlns:c16="http://schemas.microsoft.com/office/drawing/2014/chart" uri="{C3380CC4-5D6E-409C-BE32-E72D297353CC}">
+                <c16:uniqueId val="{00000007-1F24-4F4A-A905-6804C1C12B60}"/>
+              </c:ext>
+            </c:extLst>
           </c:dPt>
           <c:dPt>
             <c:idx val="4"/>
@@ -1560,6 +1652,11 @@
               </a:ln>
               <a:effectLst/>
             </c:spPr>
+            <c:extLst>
+              <c:ext xmlns:c16="http://schemas.microsoft.com/office/drawing/2014/chart" uri="{C3380CC4-5D6E-409C-BE32-E72D297353CC}">
+                <c16:uniqueId val="{00000009-1F24-4F4A-A905-6804C1C12B60}"/>
+              </c:ext>
+            </c:extLst>
           </c:dPt>
           <c:dPt>
             <c:idx val="5"/>
@@ -1575,6 +1672,11 @@
               </a:ln>
               <a:effectLst/>
             </c:spPr>
+            <c:extLst>
+              <c:ext xmlns:c16="http://schemas.microsoft.com/office/drawing/2014/chart" uri="{C3380CC4-5D6E-409C-BE32-E72D297353CC}">
+                <c16:uniqueId val="{0000000B-1F24-4F4A-A905-6804C1C12B60}"/>
+              </c:ext>
+            </c:extLst>
           </c:dPt>
           <c:cat>
             <c:strRef>
@@ -1743,37 +1845,7 @@
     </mc:Fallback>
   </mc:AlternateContent>
   <c:chart>
-    <c:title>
-      <c:overlay val="0"/>
-      <c:spPr>
-        <a:noFill/>
-        <a:ln>
-          <a:noFill/>
-        </a:ln>
-        <a:effectLst/>
-      </c:spPr>
-      <c:txPr>
-        <a:bodyPr rot="0" spcFirstLastPara="1" vertOverflow="ellipsis" vert="horz" wrap="square" anchor="ctr" anchorCtr="1"/>
-        <a:lstStyle/>
-        <a:p>
-          <a:pPr>
-            <a:defRPr sz="1862" b="0" i="0" u="none" strike="noStrike" kern="1200" spc="0" baseline="0">
-              <a:solidFill>
-                <a:schemeClr val="tx1">
-                  <a:lumMod val="65000"/>
-                  <a:lumOff val="35000"/>
-                </a:schemeClr>
-              </a:solidFill>
-              <a:latin typeface="+mn-lt"/>
-              <a:ea typeface="+mn-ea"/>
-              <a:cs typeface="+mn-cs"/>
-            </a:defRPr>
-          </a:pPr>
-          <a:endParaRPr lang="fr-FR"/>
-        </a:p>
-      </c:txPr>
-    </c:title>
-    <c:autoTitleDeleted val="0"/>
+    <c:autoTitleDeleted val="1"/>
     <c:plotArea>
       <c:layout/>
       <c:pieChart>
@@ -1787,7 +1859,7 @@
               <c:strCache>
                 <c:ptCount val="1"/>
                 <c:pt idx="0">
-                  <c:v>Ventes</c:v>
+                  <c:v>Colonne1</c:v>
                 </c:pt>
               </c:strCache>
             </c:strRef>
@@ -1806,6 +1878,11 @@
               </a:ln>
               <a:effectLst/>
             </c:spPr>
+            <c:extLst>
+              <c:ext xmlns:c16="http://schemas.microsoft.com/office/drawing/2014/chart" uri="{C3380CC4-5D6E-409C-BE32-E72D297353CC}">
+                <c16:uniqueId val="{00000001-171C-4987-B850-CF517AFE4E3D}"/>
+              </c:ext>
+            </c:extLst>
           </c:dPt>
           <c:dPt>
             <c:idx val="1"/>
@@ -1821,6 +1898,11 @@
               </a:ln>
               <a:effectLst/>
             </c:spPr>
+            <c:extLst>
+              <c:ext xmlns:c16="http://schemas.microsoft.com/office/drawing/2014/chart" uri="{C3380CC4-5D6E-409C-BE32-E72D297353CC}">
+                <c16:uniqueId val="{00000003-171C-4987-B850-CF517AFE4E3D}"/>
+              </c:ext>
+            </c:extLst>
           </c:dPt>
           <c:dPt>
             <c:idx val="2"/>
@@ -1836,6 +1918,11 @@
               </a:ln>
               <a:effectLst/>
             </c:spPr>
+            <c:extLst>
+              <c:ext xmlns:c16="http://schemas.microsoft.com/office/drawing/2014/chart" uri="{C3380CC4-5D6E-409C-BE32-E72D297353CC}">
+                <c16:uniqueId val="{00000005-171C-4987-B850-CF517AFE4E3D}"/>
+              </c:ext>
+            </c:extLst>
           </c:dPt>
           <c:dPt>
             <c:idx val="3"/>
@@ -1864,16 +1951,16 @@
               <c:strCache>
                 <c:ptCount val="4"/>
                 <c:pt idx="0">
-                  <c:v>1er trim.</c:v>
+                  <c:v>Prise en main</c:v>
                 </c:pt>
                 <c:pt idx="1">
-                  <c:v>2e trim.</c:v>
+                  <c:v>CSV</c:v>
                 </c:pt>
                 <c:pt idx="2">
-                  <c:v>3e trim.</c:v>
+                  <c:v>Classe de test</c:v>
                 </c:pt>
                 <c:pt idx="3">
-                  <c:v>4e trim.</c:v>
+                  <c:v>Test</c:v>
                 </c:pt>
               </c:strCache>
             </c:strRef>
@@ -1885,16 +1972,16 @@
                 <c:formatCode>General</c:formatCode>
                 <c:ptCount val="4"/>
                 <c:pt idx="0">
-                  <c:v>8.1999999999999993</c:v>
+                  <c:v>0.2</c:v>
                 </c:pt>
                 <c:pt idx="1">
-                  <c:v>3.2</c:v>
+                  <c:v>0.2</c:v>
                 </c:pt>
                 <c:pt idx="2">
-                  <c:v>1.4</c:v>
+                  <c:v>0.5</c:v>
                 </c:pt>
                 <c:pt idx="3">
-                  <c:v>1.2</c:v>
+                  <c:v>0.1</c:v>
                 </c:pt>
               </c:numCache>
             </c:numRef>
@@ -2044,6 +2131,11 @@
                 </a:contourClr>
               </a:sp3d>
             </c:spPr>
+            <c:extLst>
+              <c:ext xmlns:c16="http://schemas.microsoft.com/office/drawing/2014/chart" uri="{C3380CC4-5D6E-409C-BE32-E72D297353CC}">
+                <c16:uniqueId val="{00000001-5725-43AE-AECB-78D7949DE719}"/>
+              </c:ext>
+            </c:extLst>
           </c:dPt>
           <c:dPt>
             <c:idx val="1"/>
@@ -2067,6 +2159,11 @@
                 </a:contourClr>
               </a:sp3d>
             </c:spPr>
+            <c:extLst>
+              <c:ext xmlns:c16="http://schemas.microsoft.com/office/drawing/2014/chart" uri="{C3380CC4-5D6E-409C-BE32-E72D297353CC}">
+                <c16:uniqueId val="{00000003-5725-43AE-AECB-78D7949DE719}"/>
+              </c:ext>
+            </c:extLst>
           </c:dPt>
           <c:dPt>
             <c:idx val="2"/>
@@ -2090,6 +2187,11 @@
                 </a:contourClr>
               </a:sp3d>
             </c:spPr>
+            <c:extLst>
+              <c:ext xmlns:c16="http://schemas.microsoft.com/office/drawing/2014/chart" uri="{C3380CC4-5D6E-409C-BE32-E72D297353CC}">
+                <c16:uniqueId val="{00000005-5725-43AE-AECB-78D7949DE719}"/>
+              </c:ext>
+            </c:extLst>
           </c:dPt>
           <c:dPt>
             <c:idx val="3"/>
@@ -2113,6 +2215,11 @@
                 </a:contourClr>
               </a:sp3d>
             </c:spPr>
+            <c:extLst>
+              <c:ext xmlns:c16="http://schemas.microsoft.com/office/drawing/2014/chart" uri="{C3380CC4-5D6E-409C-BE32-E72D297353CC}">
+                <c16:uniqueId val="{00000007-5725-43AE-AECB-78D7949DE719}"/>
+              </c:ext>
+            </c:extLst>
           </c:dPt>
           <c:dLbls>
             <c:spPr>
@@ -11069,83 +11176,8 @@
           <a:p>
             <a:r>
               <a:rPr lang="fr-FR" dirty="0"/>
-              <a:t>Phase de Test</a:t>
-            </a:r>
-          </a:p>
-        </p:txBody>
-      </p:sp>
-      <p:sp>
-        <p:nvSpPr>
-          <p:cNvPr id="3" name="Espace réservé du texte 2">
-            <a:extLst>
-              <a:ext uri="{FF2B5EF4-FFF2-40B4-BE49-F238E27FC236}">
-                <a16:creationId xmlns:a16="http://schemas.microsoft.com/office/drawing/2014/main" id="{C29F7321-27E5-4F26-A662-54F5D5FBFC88}"/>
-              </a:ext>
-            </a:extLst>
-          </p:cNvPr>
-          <p:cNvSpPr>
-            <a:spLocks noGrp="1"/>
-          </p:cNvSpPr>
-          <p:nvPr>
-            <p:ph type="body" idx="1"/>
-          </p:nvPr>
-        </p:nvSpPr>
-        <p:spPr/>
-        <p:txBody>
-          <a:bodyPr/>
-          <a:lstStyle/>
-          <a:p>
-            <a:endParaRPr lang="fr-FR"/>
-          </a:p>
-        </p:txBody>
-      </p:sp>
-      <p:sp>
-        <p:nvSpPr>
-          <p:cNvPr id="4" name="Espace réservé du contenu 3">
-            <a:extLst>
-              <a:ext uri="{FF2B5EF4-FFF2-40B4-BE49-F238E27FC236}">
-                <a16:creationId xmlns:a16="http://schemas.microsoft.com/office/drawing/2014/main" id="{1A1E2842-46BE-4FF8-89CB-BDFBD11FE6DA}"/>
-              </a:ext>
-            </a:extLst>
-          </p:cNvPr>
-          <p:cNvSpPr>
-            <a:spLocks noGrp="1"/>
-          </p:cNvSpPr>
-          <p:nvPr>
-            <p:ph sz="half" idx="2"/>
-          </p:nvPr>
-        </p:nvSpPr>
-        <p:spPr/>
-        <p:txBody>
-          <a:bodyPr/>
-          <a:lstStyle/>
-          <a:p>
-            <a:endParaRPr lang="fr-FR" dirty="0"/>
-          </a:p>
-        </p:txBody>
-      </p:sp>
-      <p:sp>
-        <p:nvSpPr>
-          <p:cNvPr id="5" name="Espace réservé du texte 4">
-            <a:extLst>
-              <a:ext uri="{FF2B5EF4-FFF2-40B4-BE49-F238E27FC236}">
-                <a16:creationId xmlns:a16="http://schemas.microsoft.com/office/drawing/2014/main" id="{8D52A8DD-5C61-4098-A25C-CF45E7F9BE7A}"/>
-              </a:ext>
-            </a:extLst>
-          </p:cNvPr>
-          <p:cNvSpPr>
-            <a:spLocks noGrp="1"/>
-          </p:cNvSpPr>
-          <p:nvPr>
-            <p:ph type="body" sz="quarter" idx="3"/>
-          </p:nvPr>
-        </p:nvSpPr>
-        <p:spPr/>
-        <p:txBody>
-          <a:bodyPr/>
-          <a:lstStyle/>
-          <a:p>
-            <a:endParaRPr lang="fr-FR"/>
+              <a:t>Phase de Test – Phase préparatoire </a:t>
+            </a:r>
           </a:p>
         </p:txBody>
       </p:sp>
@@ -11165,12 +11197,74 @@
             <p:ph sz="quarter" idx="4"/>
           </p:nvPr>
         </p:nvSpPr>
-        <p:spPr/>
+        <p:spPr>
+          <a:xfrm>
+            <a:off x="836612" y="1690688"/>
+            <a:ext cx="7565266" cy="4028660"/>
+          </a:xfrm>
+        </p:spPr>
         <p:txBody>
-          <a:bodyPr/>
+          <a:bodyPr>
+            <a:normAutofit/>
+          </a:bodyPr>
           <a:lstStyle/>
           <a:p>
-            <a:endParaRPr lang="fr-FR"/>
+            <a:pPr marL="0" indent="0">
+              <a:buNone/>
+            </a:pPr>
+            <a:r>
+              <a:rPr lang="fr-FR" sz="2400" dirty="0"/>
+              <a:t>Chargement d’un fichier .top de test généré par une des deux approches</a:t>
+            </a:r>
+          </a:p>
+          <a:p>
+            <a:pPr marL="0" indent="0">
+              <a:buNone/>
+            </a:pPr>
+            <a:endParaRPr lang="fr-FR" sz="2400" dirty="0"/>
+          </a:p>
+          <a:p>
+            <a:pPr>
+              <a:buFontTx/>
+              <a:buChar char="-"/>
+            </a:pPr>
+            <a:r>
+              <a:rPr lang="fr-FR" sz="2400" dirty="0"/>
+              <a:t>Ensemble des questions enregistrées dans un fichier .txt</a:t>
+            </a:r>
+          </a:p>
+          <a:p>
+            <a:pPr>
+              <a:buFontTx/>
+              <a:buChar char="-"/>
+            </a:pPr>
+            <a:endParaRPr lang="fr-FR" sz="2400" dirty="0"/>
+          </a:p>
+          <a:p>
+            <a:pPr>
+              <a:buFontTx/>
+              <a:buChar char="-"/>
+            </a:pPr>
+            <a:r>
+              <a:rPr lang="fr-FR" sz="2400" dirty="0"/>
+              <a:t>Appel au logiciel balcon pour poser la question </a:t>
+            </a:r>
+          </a:p>
+          <a:p>
+            <a:pPr>
+              <a:buFontTx/>
+              <a:buChar char="-"/>
+            </a:pPr>
+            <a:endParaRPr lang="fr-FR" sz="2400" dirty="0"/>
+          </a:p>
+          <a:p>
+            <a:pPr marL="0" indent="0">
+              <a:buNone/>
+            </a:pPr>
+            <a:r>
+              <a:rPr lang="fr-FR" sz="2400" dirty="0"/>
+              <a:t>Connexion au Pepper </a:t>
+            </a:r>
           </a:p>
         </p:txBody>
       </p:sp>
@@ -11227,17 +11321,17 @@
           <a:p>
             <a:r>
               <a:rPr lang="fr-FR" dirty="0"/>
-              <a:t>Bilan personnel – Guillaume BERTHELON </a:t>
+              <a:t>Phase de Test – Algorithme </a:t>
             </a:r>
           </a:p>
         </p:txBody>
       </p:sp>
       <p:sp>
         <p:nvSpPr>
-          <p:cNvPr id="3" name="Espace réservé du texte 2">
+          <p:cNvPr id="6" name="Espace réservé du contenu 5">
             <a:extLst>
               <a:ext uri="{FF2B5EF4-FFF2-40B4-BE49-F238E27FC236}">
-                <a16:creationId xmlns:a16="http://schemas.microsoft.com/office/drawing/2014/main" id="{C29F7321-27E5-4F26-A662-54F5D5FBFC88}"/>
+                <a16:creationId xmlns:a16="http://schemas.microsoft.com/office/drawing/2014/main" id="{03859EAB-83D4-46B5-8E9A-528FDBFACB4C}"/>
               </a:ext>
             </a:extLst>
           </p:cNvPr>
@@ -11245,124 +11339,71 @@
             <a:spLocks noGrp="1"/>
           </p:cNvSpPr>
           <p:nvPr>
-            <p:ph type="body" idx="1"/>
+            <p:ph sz="quarter" idx="4"/>
           </p:nvPr>
         </p:nvSpPr>
         <p:spPr>
           <a:xfrm>
-            <a:off x="293251" y="1574499"/>
-            <a:ext cx="3143633" cy="518620"/>
+            <a:off x="836612" y="1417983"/>
+            <a:ext cx="7565266" cy="4028660"/>
           </a:xfrm>
         </p:spPr>
         <p:txBody>
-          <a:bodyPr/>
+          <a:bodyPr>
+            <a:normAutofit/>
+          </a:bodyPr>
           <a:lstStyle/>
           <a:p>
-            <a:r>
-              <a:rPr lang="fr-FR" dirty="0"/>
-              <a:t>Tâches principales </a:t>
+            <a:pPr marL="0" indent="0">
+              <a:buNone/>
+            </a:pPr>
+            <a:endParaRPr lang="fr-FR" sz="2400" u="sng" dirty="0"/>
+          </a:p>
+          <a:p>
+            <a:pPr marL="0" indent="0">
+              <a:buNone/>
+            </a:pPr>
+            <a:r>
+              <a:rPr lang="fr-FR" sz="2400" u="sng" dirty="0"/>
+              <a:t>Lancement de la question </a:t>
+            </a:r>
+          </a:p>
+          <a:p>
+            <a:pPr marL="0" indent="0">
+              <a:buNone/>
+            </a:pPr>
+            <a:endParaRPr lang="fr-FR" sz="2400" u="sng" dirty="0"/>
+          </a:p>
+          <a:p>
+            <a:r>
+              <a:rPr lang="fr-FR" sz="2400" dirty="0"/>
+              <a:t>Utilisation des évènements pour récupérer la réponse </a:t>
+            </a:r>
+          </a:p>
+          <a:p>
+            <a:r>
+              <a:rPr lang="fr-FR" sz="2400" dirty="0"/>
+              <a:t>Comparaison de la réponse avec notre script de génération automatique de réponse</a:t>
+            </a:r>
+          </a:p>
+          <a:p>
+            <a:r>
+              <a:rPr lang="fr-FR" sz="2400" dirty="0"/>
+              <a:t>Enregistrement des résultats et affichage sur la tablette </a:t>
+            </a:r>
+          </a:p>
+          <a:p>
+            <a:r>
+              <a:rPr lang="fr-FR" sz="2400" dirty="0"/>
+              <a:t>Temporisation faible entre chaque question (&lt; 3s)</a:t>
             </a:r>
           </a:p>
         </p:txBody>
       </p:sp>
-      <p:sp>
-        <p:nvSpPr>
-          <p:cNvPr id="4" name="Espace réservé du contenu 3">
-            <a:extLst>
-              <a:ext uri="{FF2B5EF4-FFF2-40B4-BE49-F238E27FC236}">
-                <a16:creationId xmlns:a16="http://schemas.microsoft.com/office/drawing/2014/main" id="{1A1E2842-46BE-4FF8-89CB-BDFBD11FE6DA}"/>
-              </a:ext>
-            </a:extLst>
-          </p:cNvPr>
-          <p:cNvSpPr>
-            <a:spLocks noGrp="1"/>
-          </p:cNvSpPr>
-          <p:nvPr>
-            <p:ph sz="half" idx="2"/>
-          </p:nvPr>
-        </p:nvSpPr>
-        <p:spPr>
-          <a:xfrm>
-            <a:off x="293251" y="2107242"/>
-            <a:ext cx="3631168" cy="3684588"/>
-          </a:xfrm>
-        </p:spPr>
-        <p:txBody>
-          <a:bodyPr/>
-          <a:lstStyle/>
-          <a:p>
-            <a:endParaRPr lang="fr-FR" dirty="0"/>
-          </a:p>
-        </p:txBody>
-      </p:sp>
-      <p:sp>
-        <p:nvSpPr>
-          <p:cNvPr id="5" name="Espace réservé du texte 4">
-            <a:extLst>
-              <a:ext uri="{FF2B5EF4-FFF2-40B4-BE49-F238E27FC236}">
-                <a16:creationId xmlns:a16="http://schemas.microsoft.com/office/drawing/2014/main" id="{8D52A8DD-5C61-4098-A25C-CF45E7F9BE7A}"/>
-              </a:ext>
-            </a:extLst>
-          </p:cNvPr>
-          <p:cNvSpPr>
-            <a:spLocks noGrp="1"/>
-          </p:cNvSpPr>
-          <p:nvPr>
-            <p:ph type="body" sz="quarter" idx="3"/>
-          </p:nvPr>
-        </p:nvSpPr>
-        <p:spPr>
-          <a:xfrm>
-            <a:off x="4026776" y="1269207"/>
-            <a:ext cx="4138448" cy="823912"/>
-          </a:xfrm>
-        </p:spPr>
-        <p:txBody>
-          <a:bodyPr/>
-          <a:lstStyle/>
-          <a:p>
-            <a:r>
-              <a:rPr lang="fr-FR" dirty="0"/>
-              <a:t>Répartition du temps de travail</a:t>
-            </a:r>
-          </a:p>
-        </p:txBody>
-      </p:sp>
-      <p:graphicFrame>
-        <p:nvGraphicFramePr>
-          <p:cNvPr id="11" name="Espace réservé du contenu 10">
-            <a:extLst>
-              <a:ext uri="{FF2B5EF4-FFF2-40B4-BE49-F238E27FC236}">
-                <a16:creationId xmlns:a16="http://schemas.microsoft.com/office/drawing/2014/main" id="{280206B7-FEB6-4209-81ED-4CFF05EEC113}"/>
-              </a:ext>
-            </a:extLst>
-          </p:cNvPr>
-          <p:cNvGraphicFramePr>
-            <a:graphicFrameLocks noGrp="1"/>
-          </p:cNvGraphicFramePr>
-          <p:nvPr>
-            <p:ph sz="quarter" idx="4"/>
-            <p:extLst>
-              <p:ext uri="{D42A27DB-BD31-4B8C-83A1-F6EECF244321}">
-                <p14:modId xmlns:p14="http://schemas.microsoft.com/office/powerpoint/2010/main" val="359520863"/>
-              </p:ext>
-            </p:extLst>
-          </p:nvPr>
-        </p:nvGraphicFramePr>
-        <p:xfrm>
-          <a:off x="3924419" y="2093119"/>
-          <a:ext cx="3981450" cy="3684587"/>
-        </p:xfrm>
-        <a:graphic>
-          <a:graphicData uri="http://schemas.openxmlformats.org/drawingml/2006/chart">
-            <c:chart xmlns:c="http://schemas.openxmlformats.org/drawingml/2006/chart" xmlns:r="http://schemas.openxmlformats.org/officeDocument/2006/relationships" r:id="rId2"/>
-          </a:graphicData>
-        </a:graphic>
-      </p:graphicFrame>
     </p:spTree>
     <p:extLst>
       <p:ext uri="{BB962C8B-B14F-4D97-AF65-F5344CB8AC3E}">
-        <p14:creationId xmlns:p14="http://schemas.microsoft.com/office/powerpoint/2010/main" val="511420779"/>
+        <p14:creationId xmlns:p14="http://schemas.microsoft.com/office/powerpoint/2010/main" val="3514142406"/>
       </p:ext>
     </p:extLst>
   </p:cSld>
@@ -11412,7 +11453,7 @@
           <a:p>
             <a:r>
               <a:rPr lang="fr-FR" dirty="0"/>
-              <a:t>Bilan personnel – Antoine D’AURE</a:t>
+              <a:t>Bilan personnel – Guillaume BERTHELON </a:t>
             </a:r>
           </a:p>
         </p:txBody>
@@ -11527,6 +11568,11 @@
           </p:cNvGraphicFramePr>
           <p:nvPr>
             <p:ph sz="quarter" idx="4"/>
+            <p:extLst>
+              <p:ext uri="{D42A27DB-BD31-4B8C-83A1-F6EECF244321}">
+                <p14:modId xmlns:p14="http://schemas.microsoft.com/office/powerpoint/2010/main" val="359520863"/>
+              </p:ext>
+            </p:extLst>
           </p:nvPr>
         </p:nvGraphicFramePr>
         <p:xfrm>
@@ -11542,7 +11588,7 @@
     </p:spTree>
     <p:extLst>
       <p:ext uri="{BB962C8B-B14F-4D97-AF65-F5344CB8AC3E}">
-        <p14:creationId xmlns:p14="http://schemas.microsoft.com/office/powerpoint/2010/main" val="3790482036"/>
+        <p14:creationId xmlns:p14="http://schemas.microsoft.com/office/powerpoint/2010/main" val="511420779"/>
       </p:ext>
     </p:extLst>
   </p:cSld>
@@ -11592,7 +11638,7 @@
           <a:p>
             <a:r>
               <a:rPr lang="fr-FR" dirty="0"/>
-              <a:t>Bilan personnel – Alexis Maire</a:t>
+              <a:t>Bilan personnel – Antoine D’AURE</a:t>
             </a:r>
           </a:p>
         </p:txBody>
@@ -11722,7 +11768,7 @@
     </p:spTree>
     <p:extLst>
       <p:ext uri="{BB962C8B-B14F-4D97-AF65-F5344CB8AC3E}">
-        <p14:creationId xmlns:p14="http://schemas.microsoft.com/office/powerpoint/2010/main" val="2317817543"/>
+        <p14:creationId xmlns:p14="http://schemas.microsoft.com/office/powerpoint/2010/main" val="3790482036"/>
       </p:ext>
     </p:extLst>
   </p:cSld>
@@ -11772,7 +11818,7 @@
           <a:p>
             <a:r>
               <a:rPr lang="fr-FR" dirty="0"/>
-              <a:t>Bilan personnel – Timothée OLIVES</a:t>
+              <a:t>Bilan personnel – Alexis Maire</a:t>
             </a:r>
           </a:p>
         </p:txBody>
@@ -11902,7 +11948,7 @@
     </p:spTree>
     <p:extLst>
       <p:ext uri="{BB962C8B-B14F-4D97-AF65-F5344CB8AC3E}">
-        <p14:creationId xmlns:p14="http://schemas.microsoft.com/office/powerpoint/2010/main" val="2001634516"/>
+        <p14:creationId xmlns:p14="http://schemas.microsoft.com/office/powerpoint/2010/main" val="2317817543"/>
       </p:ext>
     </p:extLst>
   </p:cSld>
@@ -11952,7 +11998,7 @@
           <a:p>
             <a:r>
               <a:rPr lang="fr-FR" dirty="0"/>
-              <a:t>Bilan personnel – Tristan PARISELLE</a:t>
+              <a:t>Bilan personnel – Timothée OLIVES</a:t>
             </a:r>
           </a:p>
         </p:txBody>
@@ -12082,7 +12128,7 @@
     </p:spTree>
     <p:extLst>
       <p:ext uri="{BB962C8B-B14F-4D97-AF65-F5344CB8AC3E}">
-        <p14:creationId xmlns:p14="http://schemas.microsoft.com/office/powerpoint/2010/main" val="1102940249"/>
+        <p14:creationId xmlns:p14="http://schemas.microsoft.com/office/powerpoint/2010/main" val="2001634516"/>
       </p:ext>
     </p:extLst>
   </p:cSld>
@@ -12132,7 +12178,7 @@
           <a:p>
             <a:r>
               <a:rPr lang="fr-FR" dirty="0"/>
-              <a:t>Bilan personnel – Antoine PORTÉ</a:t>
+              <a:t>Bilan personnel – Tristan PARISELLE</a:t>
             </a:r>
           </a:p>
         </p:txBody>
@@ -12193,61 +12239,10 @@
           </a:xfrm>
         </p:spPr>
         <p:txBody>
-          <a:bodyPr>
-            <a:normAutofit/>
-          </a:bodyPr>
+          <a:bodyPr/>
           <a:lstStyle/>
           <a:p>
-            <a:r>
-              <a:rPr lang="fr-FR" sz="2000" dirty="0"/>
-              <a:t>Prise en main de l’environnement</a:t>
-            </a:r>
-          </a:p>
-          <a:p>
-            <a:r>
-              <a:rPr lang="fr-FR" sz="2000" dirty="0"/>
-              <a:t>Exploration de l’ensemble de questions</a:t>
-            </a:r>
-          </a:p>
-          <a:p>
-            <a:r>
-              <a:rPr lang="fr-FR" sz="2000" dirty="0"/>
-              <a:t>Création </a:t>
-            </a:r>
-            <a:r>
-              <a:rPr lang="fr-FR" sz="2000" dirty="0" err="1"/>
-              <a:t>Github</a:t>
-            </a:r>
-            <a:endParaRPr lang="fr-FR" sz="2000" dirty="0"/>
-          </a:p>
-          <a:p>
-            <a:r>
-              <a:rPr lang="fr-FR" sz="2000" dirty="0"/>
-              <a:t>Tablette</a:t>
-            </a:r>
-          </a:p>
-          <a:p>
-            <a:r>
-              <a:rPr lang="fr-FR" sz="2000" dirty="0"/>
-              <a:t>Mouvement du robot en fonction du son</a:t>
-            </a:r>
-          </a:p>
-          <a:p>
-            <a:r>
-              <a:rPr lang="fr-FR" sz="2000" dirty="0"/>
-              <a:t>Présentation </a:t>
-            </a:r>
-            <a:r>
-              <a:rPr lang="fr-FR" sz="2000" dirty="0" err="1"/>
-              <a:t>finalle</a:t>
-            </a:r>
-            <a:endParaRPr lang="fr-FR" sz="2000" dirty="0"/>
-          </a:p>
-          <a:p>
-            <a:pPr marL="0" indent="0">
-              <a:buNone/>
-            </a:pPr>
-            <a:endParaRPr lang="fr-FR" sz="2000" dirty="0"/>
+            <a:endParaRPr lang="fr-FR" dirty="0"/>
           </a:p>
         </p:txBody>
       </p:sp>
@@ -12286,10 +12281,10 @@
       </p:sp>
       <p:graphicFrame>
         <p:nvGraphicFramePr>
-          <p:cNvPr id="9" name="Espace réservé du contenu 8">
+          <p:cNvPr id="11" name="Espace réservé du contenu 10">
             <a:extLst>
               <a:ext uri="{FF2B5EF4-FFF2-40B4-BE49-F238E27FC236}">
-                <a16:creationId xmlns:a16="http://schemas.microsoft.com/office/drawing/2014/main" id="{210E9348-331A-4D28-A85F-25FDC197CB73}"/>
+                <a16:creationId xmlns:a16="http://schemas.microsoft.com/office/drawing/2014/main" id="{280206B7-FEB6-4209-81ED-4CFF05EEC113}"/>
               </a:ext>
             </a:extLst>
           </p:cNvPr>
@@ -12298,16 +12293,11 @@
           </p:cNvGraphicFramePr>
           <p:nvPr>
             <p:ph sz="quarter" idx="4"/>
-            <p:extLst>
-              <p:ext uri="{D42A27DB-BD31-4B8C-83A1-F6EECF244321}">
-                <p14:modId xmlns:p14="http://schemas.microsoft.com/office/powerpoint/2010/main" val="2108739031"/>
-              </p:ext>
-            </p:extLst>
           </p:nvPr>
         </p:nvGraphicFramePr>
         <p:xfrm>
-          <a:off x="3533503" y="2263393"/>
-          <a:ext cx="4137735" cy="3684587"/>
+          <a:off x="3924419" y="2093119"/>
+          <a:ext cx="3981450" cy="3684587"/>
         </p:xfrm>
         <a:graphic>
           <a:graphicData uri="http://schemas.openxmlformats.org/drawingml/2006/chart">
@@ -12318,7 +12308,7 @@
     </p:spTree>
     <p:extLst>
       <p:ext uri="{BB962C8B-B14F-4D97-AF65-F5344CB8AC3E}">
-        <p14:creationId xmlns:p14="http://schemas.microsoft.com/office/powerpoint/2010/main" val="848313315"/>
+        <p14:creationId xmlns:p14="http://schemas.microsoft.com/office/powerpoint/2010/main" val="1102940249"/>
       </p:ext>
     </p:extLst>
   </p:cSld>
@@ -12368,7 +12358,7 @@
           <a:p>
             <a:r>
               <a:rPr lang="fr-FR" dirty="0"/>
-              <a:t>Bilan personnel – Aurélien SAUNIER</a:t>
+              <a:t>Bilan personnel – Antoine PORTÉ</a:t>
             </a:r>
           </a:p>
         </p:txBody>
@@ -12429,10 +12419,61 @@
           </a:xfrm>
         </p:spPr>
         <p:txBody>
-          <a:bodyPr/>
+          <a:bodyPr>
+            <a:normAutofit/>
+          </a:bodyPr>
           <a:lstStyle/>
           <a:p>
-            <a:endParaRPr lang="fr-FR" dirty="0"/>
+            <a:r>
+              <a:rPr lang="fr-FR" sz="2000" dirty="0"/>
+              <a:t>Prise en main de l’environnement</a:t>
+            </a:r>
+          </a:p>
+          <a:p>
+            <a:r>
+              <a:rPr lang="fr-FR" sz="2000" dirty="0"/>
+              <a:t>Exploration de l’ensemble de questions</a:t>
+            </a:r>
+          </a:p>
+          <a:p>
+            <a:r>
+              <a:rPr lang="fr-FR" sz="2000" dirty="0"/>
+              <a:t>Création </a:t>
+            </a:r>
+            <a:r>
+              <a:rPr lang="fr-FR" sz="2000" dirty="0" err="1"/>
+              <a:t>Github</a:t>
+            </a:r>
+            <a:endParaRPr lang="fr-FR" sz="2000" dirty="0"/>
+          </a:p>
+          <a:p>
+            <a:r>
+              <a:rPr lang="fr-FR" sz="2000" dirty="0"/>
+              <a:t>Tablette</a:t>
+            </a:r>
+          </a:p>
+          <a:p>
+            <a:r>
+              <a:rPr lang="fr-FR" sz="2000" dirty="0"/>
+              <a:t>Mouvement du robot en fonction du son</a:t>
+            </a:r>
+          </a:p>
+          <a:p>
+            <a:r>
+              <a:rPr lang="fr-FR" sz="2000" dirty="0"/>
+              <a:t>Présentation </a:t>
+            </a:r>
+            <a:r>
+              <a:rPr lang="fr-FR" sz="2000" dirty="0" err="1"/>
+              <a:t>finalle</a:t>
+            </a:r>
+            <a:endParaRPr lang="fr-FR" sz="2000" dirty="0"/>
+          </a:p>
+          <a:p>
+            <a:pPr marL="0" indent="0">
+              <a:buNone/>
+            </a:pPr>
+            <a:endParaRPr lang="fr-FR" sz="2000" dirty="0"/>
           </a:p>
         </p:txBody>
       </p:sp>
@@ -12471,10 +12512,10 @@
       </p:sp>
       <p:graphicFrame>
         <p:nvGraphicFramePr>
-          <p:cNvPr id="11" name="Espace réservé du contenu 10">
+          <p:cNvPr id="9" name="Espace réservé du contenu 8">
             <a:extLst>
               <a:ext uri="{FF2B5EF4-FFF2-40B4-BE49-F238E27FC236}">
-                <a16:creationId xmlns:a16="http://schemas.microsoft.com/office/drawing/2014/main" id="{280206B7-FEB6-4209-81ED-4CFF05EEC113}"/>
+                <a16:creationId xmlns:a16="http://schemas.microsoft.com/office/drawing/2014/main" id="{210E9348-331A-4D28-A85F-25FDC197CB73}"/>
               </a:ext>
             </a:extLst>
           </p:cNvPr>
@@ -12483,11 +12524,16 @@
           </p:cNvGraphicFramePr>
           <p:nvPr>
             <p:ph sz="quarter" idx="4"/>
+            <p:extLst>
+              <p:ext uri="{D42A27DB-BD31-4B8C-83A1-F6EECF244321}">
+                <p14:modId xmlns:p14="http://schemas.microsoft.com/office/powerpoint/2010/main" val="2108739031"/>
+              </p:ext>
+            </p:extLst>
           </p:nvPr>
         </p:nvGraphicFramePr>
         <p:xfrm>
-          <a:off x="3924419" y="2093119"/>
-          <a:ext cx="3981450" cy="3684587"/>
+          <a:off x="3533503" y="2263393"/>
+          <a:ext cx="4137735" cy="3684587"/>
         </p:xfrm>
         <a:graphic>
           <a:graphicData uri="http://schemas.openxmlformats.org/drawingml/2006/chart">
@@ -12498,7 +12544,7 @@
     </p:spTree>
     <p:extLst>
       <p:ext uri="{BB962C8B-B14F-4D97-AF65-F5344CB8AC3E}">
-        <p14:creationId xmlns:p14="http://schemas.microsoft.com/office/powerpoint/2010/main" val="3762136781"/>
+        <p14:creationId xmlns:p14="http://schemas.microsoft.com/office/powerpoint/2010/main" val="848313315"/>
       </p:ext>
     </p:extLst>
   </p:cSld>
@@ -12735,7 +12781,7 @@
           <a:p>
             <a:r>
               <a:rPr lang="fr-FR" dirty="0"/>
-              <a:t>Bilan de groupe</a:t>
+              <a:t>Bilan personnel – Aurélien SAUNIER</a:t>
             </a:r>
           </a:p>
         </p:txBody>
@@ -12756,14 +12802,19 @@
             <p:ph type="body" idx="1"/>
           </p:nvPr>
         </p:nvSpPr>
-        <p:spPr/>
+        <p:spPr>
+          <a:xfrm>
+            <a:off x="293251" y="1574499"/>
+            <a:ext cx="3143633" cy="518620"/>
+          </a:xfrm>
+        </p:spPr>
         <p:txBody>
           <a:bodyPr/>
           <a:lstStyle/>
           <a:p>
             <a:r>
               <a:rPr lang="fr-FR" dirty="0"/>
-              <a:t>Mise en situation équipe d’ingénieur de développements</a:t>
+              <a:t>Tâches principales </a:t>
             </a:r>
           </a:p>
         </p:txBody>
@@ -12784,35 +12835,65 @@
             <p:ph sz="half" idx="2"/>
           </p:nvPr>
         </p:nvSpPr>
-        <p:spPr/>
+        <p:spPr>
+          <a:xfrm>
+            <a:off x="293250" y="2093119"/>
+            <a:ext cx="3733525" cy="3684588"/>
+          </a:xfrm>
+        </p:spPr>
         <p:txBody>
-          <a:bodyPr/>
+          <a:bodyPr>
+            <a:normAutofit/>
+          </a:bodyPr>
           <a:lstStyle/>
           <a:p>
             <a:r>
-              <a:rPr lang="fr-FR" dirty="0"/>
-              <a:t>Lundi : </a:t>
-            </a:r>
-          </a:p>
-          <a:p>
-            <a:pPr lvl="1"/>
-            <a:r>
-              <a:rPr lang="fr-FR" dirty="0"/>
-              <a:t>Compte rendu de la semaine passée</a:t>
-            </a:r>
-          </a:p>
-          <a:p>
-            <a:pPr lvl="1"/>
-            <a:r>
-              <a:rPr lang="fr-FR" dirty="0"/>
-              <a:t>Répartition des taches de la semaine à venir</a:t>
-            </a:r>
-          </a:p>
-          <a:p>
-            <a:r>
-              <a:rPr lang="fr-FR" dirty="0"/>
-              <a:t>Bonne entente et répartition des taches</a:t>
-            </a:r>
+              <a:rPr lang="fr-FR" sz="1800" dirty="0"/>
+              <a:t>Prise en main de l’environnement et notamment du fonctionnement des  évènements </a:t>
+            </a:r>
+          </a:p>
+          <a:p>
+            <a:pPr marL="0" indent="0">
+              <a:buNone/>
+            </a:pPr>
+            <a:endParaRPr lang="fr-FR" sz="1800" dirty="0"/>
+          </a:p>
+          <a:p>
+            <a:r>
+              <a:rPr lang="fr-FR" sz="1800" dirty="0"/>
+              <a:t>Développement du parseur CSV et des classes utilisées </a:t>
+            </a:r>
+          </a:p>
+          <a:p>
+            <a:pPr marL="0" indent="0">
+              <a:buNone/>
+            </a:pPr>
+            <a:endParaRPr lang="fr-FR" sz="1800" dirty="0"/>
+          </a:p>
+          <a:p>
+            <a:r>
+              <a:rPr lang="fr-FR" sz="1800" dirty="0"/>
+              <a:t>Mise en place de la classe </a:t>
+            </a:r>
+            <a:r>
+              <a:rPr lang="fr-FR" sz="1800"/>
+              <a:t>de test</a:t>
+            </a:r>
+          </a:p>
+          <a:p>
+            <a:pPr marL="0" indent="0">
+              <a:buNone/>
+            </a:pPr>
+            <a:endParaRPr lang="fr-FR" sz="1800" dirty="0"/>
+          </a:p>
+          <a:p>
+            <a:r>
+              <a:rPr lang="fr-FR" sz="1800" dirty="0"/>
+              <a:t>Test et récupération des résultats</a:t>
+            </a:r>
+          </a:p>
+          <a:p>
+            <a:endParaRPr lang="fr-FR" dirty="0"/>
           </a:p>
         </p:txBody>
       </p:sp>
@@ -12832,7 +12913,12 @@
             <p:ph type="body" sz="quarter" idx="3"/>
           </p:nvPr>
         </p:nvSpPr>
-        <p:spPr/>
+        <p:spPr>
+          <a:xfrm>
+            <a:off x="4026776" y="1269207"/>
+            <a:ext cx="4138448" cy="823912"/>
+          </a:xfrm>
+        </p:spPr>
         <p:txBody>
           <a:bodyPr/>
           <a:lstStyle/>
@@ -12846,10 +12932,10 @@
       </p:sp>
       <p:graphicFrame>
         <p:nvGraphicFramePr>
-          <p:cNvPr id="17" name="Espace réservé du contenu 16">
+          <p:cNvPr id="11" name="Espace réservé du contenu 10">
             <a:extLst>
               <a:ext uri="{FF2B5EF4-FFF2-40B4-BE49-F238E27FC236}">
-                <a16:creationId xmlns:a16="http://schemas.microsoft.com/office/drawing/2014/main" id="{BFEB7FF6-4568-4721-8025-E7738259AAAD}"/>
+                <a16:creationId xmlns:a16="http://schemas.microsoft.com/office/drawing/2014/main" id="{280206B7-FEB6-4209-81ED-4CFF05EEC113}"/>
               </a:ext>
             </a:extLst>
           </p:cNvPr>
@@ -12860,14 +12946,14 @@
             <p:ph sz="quarter" idx="4"/>
             <p:extLst>
               <p:ext uri="{D42A27DB-BD31-4B8C-83A1-F6EECF244321}">
-                <p14:modId xmlns:p14="http://schemas.microsoft.com/office/powerpoint/2010/main" val="2190791011"/>
+                <p14:modId xmlns:p14="http://schemas.microsoft.com/office/powerpoint/2010/main" val="2250247060"/>
               </p:ext>
             </p:extLst>
           </p:nvPr>
         </p:nvGraphicFramePr>
         <p:xfrm>
-          <a:off x="6529551" y="2505075"/>
-          <a:ext cx="5357813" cy="3987800"/>
+          <a:off x="3924419" y="2093119"/>
+          <a:ext cx="3981450" cy="3684587"/>
         </p:xfrm>
         <a:graphic>
           <a:graphicData uri="http://schemas.openxmlformats.org/drawingml/2006/chart">
@@ -12878,7 +12964,7 @@
     </p:spTree>
     <p:extLst>
       <p:ext uri="{BB962C8B-B14F-4D97-AF65-F5344CB8AC3E}">
-        <p14:creationId xmlns:p14="http://schemas.microsoft.com/office/powerpoint/2010/main" val="2894810776"/>
+        <p14:creationId xmlns:p14="http://schemas.microsoft.com/office/powerpoint/2010/main" val="3762136781"/>
       </p:ext>
     </p:extLst>
   </p:cSld>
@@ -12928,7 +13014,35 @@
           <a:p>
             <a:r>
               <a:rPr lang="fr-FR" dirty="0"/>
-              <a:t>Conclusion</a:t>
+              <a:t>Bilan de groupe</a:t>
+            </a:r>
+          </a:p>
+        </p:txBody>
+      </p:sp>
+      <p:sp>
+        <p:nvSpPr>
+          <p:cNvPr id="3" name="Espace réservé du texte 2">
+            <a:extLst>
+              <a:ext uri="{FF2B5EF4-FFF2-40B4-BE49-F238E27FC236}">
+                <a16:creationId xmlns:a16="http://schemas.microsoft.com/office/drawing/2014/main" id="{C29F7321-27E5-4F26-A662-54F5D5FBFC88}"/>
+              </a:ext>
+            </a:extLst>
+          </p:cNvPr>
+          <p:cNvSpPr>
+            <a:spLocks noGrp="1"/>
+          </p:cNvSpPr>
+          <p:nvPr>
+            <p:ph type="body" idx="1"/>
+          </p:nvPr>
+        </p:nvSpPr>
+        <p:spPr/>
+        <p:txBody>
+          <a:bodyPr/>
+          <a:lstStyle/>
+          <a:p>
+            <a:r>
+              <a:rPr lang="fr-FR" dirty="0"/>
+              <a:t>Mise en situation équipe d’ingénieur de développements</a:t>
             </a:r>
           </a:p>
         </p:txBody>
@@ -12949,6 +13063,171 @@
             <p:ph sz="half" idx="2"/>
           </p:nvPr>
         </p:nvSpPr>
+        <p:spPr/>
+        <p:txBody>
+          <a:bodyPr/>
+          <a:lstStyle/>
+          <a:p>
+            <a:r>
+              <a:rPr lang="fr-FR" dirty="0"/>
+              <a:t>Lundi : </a:t>
+            </a:r>
+          </a:p>
+          <a:p>
+            <a:pPr lvl="1"/>
+            <a:r>
+              <a:rPr lang="fr-FR" dirty="0"/>
+              <a:t>Compte rendu de la semaine passée</a:t>
+            </a:r>
+          </a:p>
+          <a:p>
+            <a:pPr lvl="1"/>
+            <a:r>
+              <a:rPr lang="fr-FR" dirty="0"/>
+              <a:t>Répartition des taches de la semaine à venir</a:t>
+            </a:r>
+          </a:p>
+          <a:p>
+            <a:r>
+              <a:rPr lang="fr-FR" dirty="0"/>
+              <a:t>Bonne entente et répartition des taches</a:t>
+            </a:r>
+          </a:p>
+        </p:txBody>
+      </p:sp>
+      <p:sp>
+        <p:nvSpPr>
+          <p:cNvPr id="5" name="Espace réservé du texte 4">
+            <a:extLst>
+              <a:ext uri="{FF2B5EF4-FFF2-40B4-BE49-F238E27FC236}">
+                <a16:creationId xmlns:a16="http://schemas.microsoft.com/office/drawing/2014/main" id="{8D52A8DD-5C61-4098-A25C-CF45E7F9BE7A}"/>
+              </a:ext>
+            </a:extLst>
+          </p:cNvPr>
+          <p:cNvSpPr>
+            <a:spLocks noGrp="1"/>
+          </p:cNvSpPr>
+          <p:nvPr>
+            <p:ph type="body" sz="quarter" idx="3"/>
+          </p:nvPr>
+        </p:nvSpPr>
+        <p:spPr/>
+        <p:txBody>
+          <a:bodyPr/>
+          <a:lstStyle/>
+          <a:p>
+            <a:r>
+              <a:rPr lang="fr-FR" dirty="0"/>
+              <a:t>Répartition du temps de travail</a:t>
+            </a:r>
+          </a:p>
+        </p:txBody>
+      </p:sp>
+      <p:graphicFrame>
+        <p:nvGraphicFramePr>
+          <p:cNvPr id="17" name="Espace réservé du contenu 16">
+            <a:extLst>
+              <a:ext uri="{FF2B5EF4-FFF2-40B4-BE49-F238E27FC236}">
+                <a16:creationId xmlns:a16="http://schemas.microsoft.com/office/drawing/2014/main" id="{BFEB7FF6-4568-4721-8025-E7738259AAAD}"/>
+              </a:ext>
+            </a:extLst>
+          </p:cNvPr>
+          <p:cNvGraphicFramePr>
+            <a:graphicFrameLocks noGrp="1"/>
+          </p:cNvGraphicFramePr>
+          <p:nvPr>
+            <p:ph sz="quarter" idx="4"/>
+            <p:extLst>
+              <p:ext uri="{D42A27DB-BD31-4B8C-83A1-F6EECF244321}">
+                <p14:modId xmlns:p14="http://schemas.microsoft.com/office/powerpoint/2010/main" val="2190791011"/>
+              </p:ext>
+            </p:extLst>
+          </p:nvPr>
+        </p:nvGraphicFramePr>
+        <p:xfrm>
+          <a:off x="6529551" y="2505075"/>
+          <a:ext cx="5357813" cy="3987800"/>
+        </p:xfrm>
+        <a:graphic>
+          <a:graphicData uri="http://schemas.openxmlformats.org/drawingml/2006/chart">
+            <c:chart xmlns:c="http://schemas.openxmlformats.org/drawingml/2006/chart" xmlns:r="http://schemas.openxmlformats.org/officeDocument/2006/relationships" r:id="rId2"/>
+          </a:graphicData>
+        </a:graphic>
+      </p:graphicFrame>
+    </p:spTree>
+    <p:extLst>
+      <p:ext uri="{BB962C8B-B14F-4D97-AF65-F5344CB8AC3E}">
+        <p14:creationId xmlns:p14="http://schemas.microsoft.com/office/powerpoint/2010/main" val="2894810776"/>
+      </p:ext>
+    </p:extLst>
+  </p:cSld>
+  <p:clrMapOvr>
+    <a:masterClrMapping/>
+  </p:clrMapOvr>
+</p:sld>
+</file>
+
+<file path=ppt/slides/slide22.xml><?xml version="1.0" encoding="utf-8"?>
+<p:sld xmlns:a="http://schemas.openxmlformats.org/drawingml/2006/main" xmlns:r="http://schemas.openxmlformats.org/officeDocument/2006/relationships" xmlns:p="http://schemas.openxmlformats.org/presentationml/2006/main">
+  <p:cSld>
+    <p:spTree>
+      <p:nvGrpSpPr>
+        <p:cNvPr id="1" name=""/>
+        <p:cNvGrpSpPr/>
+        <p:nvPr/>
+      </p:nvGrpSpPr>
+      <p:grpSpPr>
+        <a:xfrm>
+          <a:off x="0" y="0"/>
+          <a:ext cx="0" cy="0"/>
+          <a:chOff x="0" y="0"/>
+          <a:chExt cx="0" cy="0"/>
+        </a:xfrm>
+      </p:grpSpPr>
+      <p:sp>
+        <p:nvSpPr>
+          <p:cNvPr id="2" name="Titre 1">
+            <a:extLst>
+              <a:ext uri="{FF2B5EF4-FFF2-40B4-BE49-F238E27FC236}">
+                <a16:creationId xmlns:a16="http://schemas.microsoft.com/office/drawing/2014/main" id="{6CA294AB-36EE-442C-977C-ACC9BCD37340}"/>
+              </a:ext>
+            </a:extLst>
+          </p:cNvPr>
+          <p:cNvSpPr>
+            <a:spLocks noGrp="1"/>
+          </p:cNvSpPr>
+          <p:nvPr>
+            <p:ph type="title"/>
+          </p:nvPr>
+        </p:nvSpPr>
+        <p:spPr/>
+        <p:txBody>
+          <a:bodyPr/>
+          <a:lstStyle/>
+          <a:p>
+            <a:r>
+              <a:rPr lang="fr-FR" dirty="0"/>
+              <a:t>Conclusion</a:t>
+            </a:r>
+          </a:p>
+        </p:txBody>
+      </p:sp>
+      <p:sp>
+        <p:nvSpPr>
+          <p:cNvPr id="4" name="Espace réservé du contenu 3">
+            <a:extLst>
+              <a:ext uri="{FF2B5EF4-FFF2-40B4-BE49-F238E27FC236}">
+                <a16:creationId xmlns:a16="http://schemas.microsoft.com/office/drawing/2014/main" id="{1A1E2842-46BE-4FF8-89CB-BDFBD11FE6DA}"/>
+              </a:ext>
+            </a:extLst>
+          </p:cNvPr>
+          <p:cNvSpPr>
+            <a:spLocks noGrp="1"/>
+          </p:cNvSpPr>
+          <p:nvPr>
+            <p:ph sz="half" idx="2"/>
+          </p:nvPr>
+        </p:nvSpPr>
         <p:spPr>
           <a:xfrm>
             <a:off x="839788" y="1690688"/>
@@ -13049,7 +13328,7 @@
         </p:spPr>
         <p:txBody>
           <a:bodyPr>
-            <a:normAutofit lnSpcReduction="10000"/>
+            <a:normAutofit/>
           </a:bodyPr>
           <a:lstStyle/>
           <a:p>
@@ -13070,7 +13349,7 @@
 </p:sld>
 </file>
 
-<file path=ppt/slides/slide22.xml><?xml version="1.0" encoding="utf-8"?>
+<file path=ppt/slides/slide23.xml><?xml version="1.0" encoding="utf-8"?>
 <p:sld xmlns:a="http://schemas.openxmlformats.org/drawingml/2006/main" xmlns:r="http://schemas.openxmlformats.org/officeDocument/2006/relationships" xmlns:p="http://schemas.openxmlformats.org/presentationml/2006/main">
   <p:cSld>
     <p:spTree>

</xml_diff>